<commit_message>
tela produto com links para outras páginas e alteração no footer que sera inplementado
</commit_message>
<xml_diff>
--- a/Documentação/DiagramaDeSolução.pptx
+++ b/Documentação/DiagramaDeSolução.pptx
@@ -1,62 +1,29 @@
 
 <file path=ppt/presentation.xml><?xml version="1.0" encoding="utf-8"?>
-<p:presentation xmlns:a="http://schemas.openxmlformats.org/drawingml/2006/main" xmlns:r="http://schemas.openxmlformats.org/officeDocument/2006/relationships" xmlns:p="http://schemas.openxmlformats.org/presentationml/2006/main" saveSubsetFonts="1" embedTrueTypeFonts="true">
+<p:presentation xmlns:a="http://schemas.openxmlformats.org/drawingml/2006/main" xmlns:r="http://schemas.openxmlformats.org/officeDocument/2006/relationships" xmlns:p="http://schemas.openxmlformats.org/presentationml/2006/main" embedTrueTypeFonts="1" saveSubsetFonts="1">
   <p:sldMasterIdLst>
     <p:sldMasterId id="2147483648" r:id="rId1"/>
   </p:sldMasterIdLst>
   <p:sldIdLst>
-    <p:sldId id="256" r:id="rId18"/>
+    <p:sldId id="256" r:id="rId2"/>
   </p:sldIdLst>
   <p:sldSz cx="18288000" cy="10287000"/>
   <p:notesSz cx="6858000" cy="9144000"/>
   <p:embeddedFontLst>
     <p:embeddedFont>
-      <p:font typeface="Arimo" charset="1" panose="020B0604020202020204"/>
-      <p:regular r:id="rId6"/>
+      <p:font typeface="Calibri" panose="020F0502020204030204" pitchFamily="34" charset="0"/>
+      <p:regular r:id="rId3"/>
+      <p:bold r:id="rId4"/>
+      <p:italic r:id="rId5"/>
+      <p:boldItalic r:id="rId6"/>
     </p:embeddedFont>
     <p:embeddedFont>
-      <p:font typeface="Arimo Bold" charset="1" panose="020B0704020202020204"/>
+      <p:font typeface="Open Sans" panose="020B0606030504020204" pitchFamily="34" charset="0"/>
       <p:regular r:id="rId7"/>
     </p:embeddedFont>
     <p:embeddedFont>
-      <p:font typeface="Arimo Italics" charset="1" panose="020B0604020202090204"/>
+      <p:font typeface="Open Sans Bold" panose="020B0806030504020204" charset="0"/>
       <p:regular r:id="rId8"/>
-    </p:embeddedFont>
-    <p:embeddedFont>
-      <p:font typeface="Arimo Bold Italics" charset="1" panose="020B0704020202090204"/>
-      <p:regular r:id="rId9"/>
-    </p:embeddedFont>
-    <p:embeddedFont>
-      <p:font typeface="Open Sans" charset="1" panose="020B0606030504020204"/>
-      <p:regular r:id="rId10"/>
-    </p:embeddedFont>
-    <p:embeddedFont>
-      <p:font typeface="Open Sans Bold" charset="1" panose="020B0806030504020204"/>
-      <p:regular r:id="rId11"/>
-    </p:embeddedFont>
-    <p:embeddedFont>
-      <p:font typeface="Open Sans Italics" charset="1" panose="020B0606030504020204"/>
-      <p:regular r:id="rId12"/>
-    </p:embeddedFont>
-    <p:embeddedFont>
-      <p:font typeface="Open Sans Bold Italics" charset="1" panose="020B0806030504020204"/>
-      <p:regular r:id="rId13"/>
-    </p:embeddedFont>
-    <p:embeddedFont>
-      <p:font typeface="Open Sans Light" charset="1" panose="020B0306030504020204"/>
-      <p:regular r:id="rId14"/>
-    </p:embeddedFont>
-    <p:embeddedFont>
-      <p:font typeface="Open Sans Light Italics" charset="1" panose="020B0306030504020204"/>
-      <p:regular r:id="rId15"/>
-    </p:embeddedFont>
-    <p:embeddedFont>
-      <p:font typeface="Open Sans Ultra-Bold" charset="1" panose="00000000000000000000"/>
-      <p:regular r:id="rId16"/>
-    </p:embeddedFont>
-    <p:embeddedFont>
-      <p:font typeface="Open Sans Ultra-Bold Italics" charset="1" panose="00000000000000000000"/>
-      <p:regular r:id="rId17"/>
     </p:embeddedFont>
   </p:embeddedFontLst>
   <p:defaultTextStyle>
@@ -154,7 +121,60 @@
       </a:defRPr>
     </a:lvl9pPr>
   </p:defaultTextStyle>
+  <p:extLst>
+    <p:ext uri="{EFAFB233-063F-42B5-8137-9DF3F51BA10A}">
+      <p15:sldGuideLst xmlns:p15="http://schemas.microsoft.com/office/powerpoint/2012/main">
+        <p15:guide id="1" orient="horz" pos="2160">
+          <p15:clr>
+            <a:srgbClr val="A4A3A4"/>
+          </p15:clr>
+        </p15:guide>
+        <p15:guide id="2" pos="2880">
+          <p15:clr>
+            <a:srgbClr val="A4A3A4"/>
+          </p15:clr>
+        </p15:guide>
+      </p15:sldGuideLst>
+    </p:ext>
+  </p:extLst>
 </p:presentation>
+</file>
+
+<file path=ppt/changesInfos/changesInfo1.xml><?xml version="1.0" encoding="utf-8"?>
+<pc:chgInfo xmlns:a="http://schemas.openxmlformats.org/drawingml/2006/main" xmlns:r="http://schemas.openxmlformats.org/officeDocument/2006/relationships" xmlns:ac="http://schemas.microsoft.com/office/drawing/2013/main/command" xmlns:pc="http://schemas.microsoft.com/office/powerpoint/2013/main/command">
+  <pc:docChgLst>
+    <pc:chgData name="Gu Bueno" userId="3fb330565894022c" providerId="LiveId" clId="{4DB202FD-732D-404F-8EB0-45DE7C53BDE2}"/>
+    <pc:docChg chg="modSld">
+      <pc:chgData name="Gu Bueno" userId="3fb330565894022c" providerId="LiveId" clId="{4DB202FD-732D-404F-8EB0-45DE7C53BDE2}" dt="2023-10-26T17:00:53.889" v="1" actId="1076"/>
+      <pc:docMkLst>
+        <pc:docMk/>
+      </pc:docMkLst>
+      <pc:sldChg chg="modSp mod">
+        <pc:chgData name="Gu Bueno" userId="3fb330565894022c" providerId="LiveId" clId="{4DB202FD-732D-404F-8EB0-45DE7C53BDE2}" dt="2023-10-26T17:00:53.889" v="1" actId="1076"/>
+        <pc:sldMkLst>
+          <pc:docMk/>
+          <pc:sldMk cId="0" sldId="256"/>
+        </pc:sldMkLst>
+        <pc:spChg chg="mod">
+          <ac:chgData name="Gu Bueno" userId="3fb330565894022c" providerId="LiveId" clId="{4DB202FD-732D-404F-8EB0-45DE7C53BDE2}" dt="2023-10-26T17:00:48.019" v="0" actId="1076"/>
+          <ac:spMkLst>
+            <pc:docMk/>
+            <pc:sldMk cId="0" sldId="256"/>
+            <ac:spMk id="4" creationId="{00000000-0000-0000-0000-000000000000}"/>
+          </ac:spMkLst>
+        </pc:spChg>
+        <pc:spChg chg="mod">
+          <ac:chgData name="Gu Bueno" userId="3fb330565894022c" providerId="LiveId" clId="{4DB202FD-732D-404F-8EB0-45DE7C53BDE2}" dt="2023-10-26T17:00:53.889" v="1" actId="1076"/>
+          <ac:spMkLst>
+            <pc:docMk/>
+            <pc:sldMk cId="0" sldId="256"/>
+            <ac:spMk id="10" creationId="{00000000-0000-0000-0000-000000000000}"/>
+          </ac:spMkLst>
+        </pc:spChg>
+      </pc:sldChg>
+    </pc:docChg>
+  </pc:docChgLst>
+</pc:chgInfo>
 </file>
 
 <file path=ppt/slideLayouts/slideLayout1.xml><?xml version="1.0" encoding="utf-8"?>
@@ -195,10 +215,9 @@
           <a:lstStyle/>
           <a:p>
             <a:r>
-              <a:rPr lang="en-US" smtClean="0"/>
+              <a:rPr lang="en-US"/>
               <a:t>Click to edit Master title style</a:t>
             </a:r>
-            <a:endParaRPr lang="en-US"/>
           </a:p>
         </p:txBody>
       </p:sp>
@@ -314,10 +333,9 @@
           </a:lstStyle>
           <a:p>
             <a:r>
-              <a:rPr lang="en-US" smtClean="0"/>
+              <a:rPr lang="en-US"/>
               <a:t>Click to edit Master subtitle style</a:t>
             </a:r>
-            <a:endParaRPr lang="en-US"/>
           </a:p>
         </p:txBody>
       </p:sp>
@@ -339,7 +357,7 @@
             <a:fld id="{1D8BD707-D9CF-40AE-B4C6-C98DA3205C09}" type="datetimeFigureOut">
               <a:rPr lang="en-US" smtClean="0"/>
               <a:pPr/>
-              <a:t>8/1/2011</a:t>
+              <a:t>10/26/2023</a:t>
             </a:fld>
             <a:endParaRPr lang="en-US"/>
           </a:p>
@@ -382,7 +400,7 @@
             <a:fld id="{B6F15528-21DE-4FAA-801E-634DDDAF4B2B}" type="slidenum">
               <a:rPr lang="en-US" smtClean="0"/>
               <a:pPr/>
-              <a:t>‹#›</a:t>
+              <a:t>‹nº›</a:t>
             </a:fld>
             <a:endParaRPr lang="en-US"/>
           </a:p>
@@ -429,10 +447,9 @@
           <a:lstStyle/>
           <a:p>
             <a:r>
-              <a:rPr lang="en-US" smtClean="0"/>
+              <a:rPr lang="en-US"/>
               <a:t>Click to edit Master title style</a:t>
             </a:r>
-            <a:endParaRPr lang="en-US"/>
           </a:p>
         </p:txBody>
       </p:sp>
@@ -453,38 +470,37 @@
           <a:p>
             <a:pPr lvl="0"/>
             <a:r>
-              <a:rPr lang="en-US" smtClean="0"/>
+              <a:rPr lang="en-US"/>
               <a:t>Click to edit Master text styles</a:t>
             </a:r>
           </a:p>
           <a:p>
             <a:pPr lvl="1"/>
             <a:r>
-              <a:rPr lang="en-US" smtClean="0"/>
+              <a:rPr lang="en-US"/>
               <a:t>Second level</a:t>
             </a:r>
           </a:p>
           <a:p>
             <a:pPr lvl="2"/>
             <a:r>
-              <a:rPr lang="en-US" smtClean="0"/>
+              <a:rPr lang="en-US"/>
               <a:t>Third level</a:t>
             </a:r>
           </a:p>
           <a:p>
             <a:pPr lvl="3"/>
             <a:r>
-              <a:rPr lang="en-US" smtClean="0"/>
+              <a:rPr lang="en-US"/>
               <a:t>Fourth level</a:t>
             </a:r>
           </a:p>
           <a:p>
             <a:pPr lvl="4"/>
             <a:r>
-              <a:rPr lang="en-US" smtClean="0"/>
+              <a:rPr lang="en-US"/>
               <a:t>Fifth level</a:t>
             </a:r>
-            <a:endParaRPr lang="en-US"/>
           </a:p>
         </p:txBody>
       </p:sp>
@@ -506,7 +522,7 @@
             <a:fld id="{1D8BD707-D9CF-40AE-B4C6-C98DA3205C09}" type="datetimeFigureOut">
               <a:rPr lang="en-US" smtClean="0"/>
               <a:pPr/>
-              <a:t>8/1/2011</a:t>
+              <a:t>10/26/2023</a:t>
             </a:fld>
             <a:endParaRPr lang="en-US"/>
           </a:p>
@@ -549,7 +565,7 @@
             <a:fld id="{B6F15528-21DE-4FAA-801E-634DDDAF4B2B}" type="slidenum">
               <a:rPr lang="en-US" smtClean="0"/>
               <a:pPr/>
-              <a:t>‹#›</a:t>
+              <a:t>‹nº›</a:t>
             </a:fld>
             <a:endParaRPr lang="en-US"/>
           </a:p>
@@ -601,10 +617,9 @@
           <a:lstStyle/>
           <a:p>
             <a:r>
-              <a:rPr lang="en-US" smtClean="0"/>
+              <a:rPr lang="en-US"/>
               <a:t>Click to edit Master title style</a:t>
             </a:r>
-            <a:endParaRPr lang="en-US"/>
           </a:p>
         </p:txBody>
       </p:sp>
@@ -630,38 +645,37 @@
           <a:p>
             <a:pPr lvl="0"/>
             <a:r>
-              <a:rPr lang="en-US" smtClean="0"/>
+              <a:rPr lang="en-US"/>
               <a:t>Click to edit Master text styles</a:t>
             </a:r>
           </a:p>
           <a:p>
             <a:pPr lvl="1"/>
             <a:r>
-              <a:rPr lang="en-US" smtClean="0"/>
+              <a:rPr lang="en-US"/>
               <a:t>Second level</a:t>
             </a:r>
           </a:p>
           <a:p>
             <a:pPr lvl="2"/>
             <a:r>
-              <a:rPr lang="en-US" smtClean="0"/>
+              <a:rPr lang="en-US"/>
               <a:t>Third level</a:t>
             </a:r>
           </a:p>
           <a:p>
             <a:pPr lvl="3"/>
             <a:r>
-              <a:rPr lang="en-US" smtClean="0"/>
+              <a:rPr lang="en-US"/>
               <a:t>Fourth level</a:t>
             </a:r>
           </a:p>
           <a:p>
             <a:pPr lvl="4"/>
             <a:r>
-              <a:rPr lang="en-US" smtClean="0"/>
+              <a:rPr lang="en-US"/>
               <a:t>Fifth level</a:t>
             </a:r>
-            <a:endParaRPr lang="en-US"/>
           </a:p>
         </p:txBody>
       </p:sp>
@@ -683,7 +697,7 @@
             <a:fld id="{1D8BD707-D9CF-40AE-B4C6-C98DA3205C09}" type="datetimeFigureOut">
               <a:rPr lang="en-US" smtClean="0"/>
               <a:pPr/>
-              <a:t>8/1/2011</a:t>
+              <a:t>10/26/2023</a:t>
             </a:fld>
             <a:endParaRPr lang="en-US"/>
           </a:p>
@@ -726,7 +740,7 @@
             <a:fld id="{B6F15528-21DE-4FAA-801E-634DDDAF4B2B}" type="slidenum">
               <a:rPr lang="en-US" smtClean="0"/>
               <a:pPr/>
-              <a:t>‹#›</a:t>
+              <a:t>‹nº›</a:t>
             </a:fld>
             <a:endParaRPr lang="en-US"/>
           </a:p>
@@ -773,10 +787,9 @@
           <a:lstStyle/>
           <a:p>
             <a:r>
-              <a:rPr lang="en-US" smtClean="0"/>
+              <a:rPr lang="en-US"/>
               <a:t>Click to edit Master title style</a:t>
             </a:r>
-            <a:endParaRPr lang="en-US"/>
           </a:p>
         </p:txBody>
       </p:sp>
@@ -797,38 +810,37 @@
           <a:p>
             <a:pPr lvl="0"/>
             <a:r>
-              <a:rPr lang="en-US" smtClean="0"/>
+              <a:rPr lang="en-US"/>
               <a:t>Click to edit Master text styles</a:t>
             </a:r>
           </a:p>
           <a:p>
             <a:pPr lvl="1"/>
             <a:r>
-              <a:rPr lang="en-US" smtClean="0"/>
+              <a:rPr lang="en-US"/>
               <a:t>Second level</a:t>
             </a:r>
           </a:p>
           <a:p>
             <a:pPr lvl="2"/>
             <a:r>
-              <a:rPr lang="en-US" smtClean="0"/>
+              <a:rPr lang="en-US"/>
               <a:t>Third level</a:t>
             </a:r>
           </a:p>
           <a:p>
             <a:pPr lvl="3"/>
             <a:r>
-              <a:rPr lang="en-US" smtClean="0"/>
+              <a:rPr lang="en-US"/>
               <a:t>Fourth level</a:t>
             </a:r>
           </a:p>
           <a:p>
             <a:pPr lvl="4"/>
             <a:r>
-              <a:rPr lang="en-US" smtClean="0"/>
+              <a:rPr lang="en-US"/>
               <a:t>Fifth level</a:t>
             </a:r>
-            <a:endParaRPr lang="en-US"/>
           </a:p>
         </p:txBody>
       </p:sp>
@@ -850,7 +862,7 @@
             <a:fld id="{1D8BD707-D9CF-40AE-B4C6-C98DA3205C09}" type="datetimeFigureOut">
               <a:rPr lang="en-US" smtClean="0"/>
               <a:pPr/>
-              <a:t>8/1/2011</a:t>
+              <a:t>10/26/2023</a:t>
             </a:fld>
             <a:endParaRPr lang="en-US"/>
           </a:p>
@@ -893,7 +905,7 @@
             <a:fld id="{B6F15528-21DE-4FAA-801E-634DDDAF4B2B}" type="slidenum">
               <a:rPr lang="en-US" smtClean="0"/>
               <a:pPr/>
-              <a:t>‹#›</a:t>
+              <a:t>‹nº›</a:t>
             </a:fld>
             <a:endParaRPr lang="en-US"/>
           </a:p>
@@ -949,10 +961,9 @@
           </a:lstStyle>
           <a:p>
             <a:r>
-              <a:rPr lang="en-US" smtClean="0"/>
+              <a:rPr lang="en-US"/>
               <a:t>Click to edit Master title style</a:t>
             </a:r>
-            <a:endParaRPr lang="en-US"/>
           </a:p>
         </p:txBody>
       </p:sp>
@@ -1069,7 +1080,7 @@
           <a:p>
             <a:pPr lvl="0"/>
             <a:r>
-              <a:rPr lang="en-US" smtClean="0"/>
+              <a:rPr lang="en-US"/>
               <a:t>Click to edit Master text styles</a:t>
             </a:r>
           </a:p>
@@ -1093,7 +1104,7 @@
             <a:fld id="{1D8BD707-D9CF-40AE-B4C6-C98DA3205C09}" type="datetimeFigureOut">
               <a:rPr lang="en-US" smtClean="0"/>
               <a:pPr/>
-              <a:t>8/1/2011</a:t>
+              <a:t>10/26/2023</a:t>
             </a:fld>
             <a:endParaRPr lang="en-US"/>
           </a:p>
@@ -1136,7 +1147,7 @@
             <a:fld id="{B6F15528-21DE-4FAA-801E-634DDDAF4B2B}" type="slidenum">
               <a:rPr lang="en-US" smtClean="0"/>
               <a:pPr/>
-              <a:t>‹#›</a:t>
+              <a:t>‹nº›</a:t>
             </a:fld>
             <a:endParaRPr lang="en-US"/>
           </a:p>
@@ -1183,10 +1194,9 @@
           <a:lstStyle/>
           <a:p>
             <a:r>
-              <a:rPr lang="en-US" smtClean="0"/>
+              <a:rPr lang="en-US"/>
               <a:t>Click to edit Master title style</a:t>
             </a:r>
-            <a:endParaRPr lang="en-US"/>
           </a:p>
         </p:txBody>
       </p:sp>
@@ -1240,38 +1250,37 @@
           <a:p>
             <a:pPr lvl="0"/>
             <a:r>
-              <a:rPr lang="en-US" smtClean="0"/>
+              <a:rPr lang="en-US"/>
               <a:t>Click to edit Master text styles</a:t>
             </a:r>
           </a:p>
           <a:p>
             <a:pPr lvl="1"/>
             <a:r>
-              <a:rPr lang="en-US" smtClean="0"/>
+              <a:rPr lang="en-US"/>
               <a:t>Second level</a:t>
             </a:r>
           </a:p>
           <a:p>
             <a:pPr lvl="2"/>
             <a:r>
-              <a:rPr lang="en-US" smtClean="0"/>
+              <a:rPr lang="en-US"/>
               <a:t>Third level</a:t>
             </a:r>
           </a:p>
           <a:p>
             <a:pPr lvl="3"/>
             <a:r>
-              <a:rPr lang="en-US" smtClean="0"/>
+              <a:rPr lang="en-US"/>
               <a:t>Fourth level</a:t>
             </a:r>
           </a:p>
           <a:p>
             <a:pPr lvl="4"/>
             <a:r>
-              <a:rPr lang="en-US" smtClean="0"/>
+              <a:rPr lang="en-US"/>
               <a:t>Fifth level</a:t>
             </a:r>
-            <a:endParaRPr lang="en-US"/>
           </a:p>
         </p:txBody>
       </p:sp>
@@ -1325,38 +1334,37 @@
           <a:p>
             <a:pPr lvl="0"/>
             <a:r>
-              <a:rPr lang="en-US" smtClean="0"/>
+              <a:rPr lang="en-US"/>
               <a:t>Click to edit Master text styles</a:t>
             </a:r>
           </a:p>
           <a:p>
             <a:pPr lvl="1"/>
             <a:r>
-              <a:rPr lang="en-US" smtClean="0"/>
+              <a:rPr lang="en-US"/>
               <a:t>Second level</a:t>
             </a:r>
           </a:p>
           <a:p>
             <a:pPr lvl="2"/>
             <a:r>
-              <a:rPr lang="en-US" smtClean="0"/>
+              <a:rPr lang="en-US"/>
               <a:t>Third level</a:t>
             </a:r>
           </a:p>
           <a:p>
             <a:pPr lvl="3"/>
             <a:r>
-              <a:rPr lang="en-US" smtClean="0"/>
+              <a:rPr lang="en-US"/>
               <a:t>Fourth level</a:t>
             </a:r>
           </a:p>
           <a:p>
             <a:pPr lvl="4"/>
             <a:r>
-              <a:rPr lang="en-US" smtClean="0"/>
+              <a:rPr lang="en-US"/>
               <a:t>Fifth level</a:t>
             </a:r>
-            <a:endParaRPr lang="en-US"/>
           </a:p>
         </p:txBody>
       </p:sp>
@@ -1378,7 +1386,7 @@
             <a:fld id="{1D8BD707-D9CF-40AE-B4C6-C98DA3205C09}" type="datetimeFigureOut">
               <a:rPr lang="en-US" smtClean="0"/>
               <a:pPr/>
-              <a:t>8/1/2011</a:t>
+              <a:t>10/26/2023</a:t>
             </a:fld>
             <a:endParaRPr lang="en-US"/>
           </a:p>
@@ -1421,7 +1429,7 @@
             <a:fld id="{B6F15528-21DE-4FAA-801E-634DDDAF4B2B}" type="slidenum">
               <a:rPr lang="en-US" smtClean="0"/>
               <a:pPr/>
-              <a:t>‹#›</a:t>
+              <a:t>‹nº›</a:t>
             </a:fld>
             <a:endParaRPr lang="en-US"/>
           </a:p>
@@ -1472,10 +1480,9 @@
           </a:lstStyle>
           <a:p>
             <a:r>
-              <a:rPr lang="en-US" smtClean="0"/>
+              <a:rPr lang="en-US"/>
               <a:t>Click to edit Master title style</a:t>
             </a:r>
-            <a:endParaRPr lang="en-US"/>
           </a:p>
         </p:txBody>
       </p:sp>
@@ -1538,7 +1545,7 @@
           <a:p>
             <a:pPr lvl="0"/>
             <a:r>
-              <a:rPr lang="en-US" smtClean="0"/>
+              <a:rPr lang="en-US"/>
               <a:t>Click to edit Master text styles</a:t>
             </a:r>
           </a:p>
@@ -1594,38 +1601,37 @@
           <a:p>
             <a:pPr lvl="0"/>
             <a:r>
-              <a:rPr lang="en-US" smtClean="0"/>
+              <a:rPr lang="en-US"/>
               <a:t>Click to edit Master text styles</a:t>
             </a:r>
           </a:p>
           <a:p>
             <a:pPr lvl="1"/>
             <a:r>
-              <a:rPr lang="en-US" smtClean="0"/>
+              <a:rPr lang="en-US"/>
               <a:t>Second level</a:t>
             </a:r>
           </a:p>
           <a:p>
             <a:pPr lvl="2"/>
             <a:r>
-              <a:rPr lang="en-US" smtClean="0"/>
+              <a:rPr lang="en-US"/>
               <a:t>Third level</a:t>
             </a:r>
           </a:p>
           <a:p>
             <a:pPr lvl="3"/>
             <a:r>
-              <a:rPr lang="en-US" smtClean="0"/>
+              <a:rPr lang="en-US"/>
               <a:t>Fourth level</a:t>
             </a:r>
           </a:p>
           <a:p>
             <a:pPr lvl="4"/>
             <a:r>
-              <a:rPr lang="en-US" smtClean="0"/>
+              <a:rPr lang="en-US"/>
               <a:t>Fifth level</a:t>
             </a:r>
-            <a:endParaRPr lang="en-US"/>
           </a:p>
         </p:txBody>
       </p:sp>
@@ -1688,7 +1694,7 @@
           <a:p>
             <a:pPr lvl="0"/>
             <a:r>
-              <a:rPr lang="en-US" smtClean="0"/>
+              <a:rPr lang="en-US"/>
               <a:t>Click to edit Master text styles</a:t>
             </a:r>
           </a:p>
@@ -1744,38 +1750,37 @@
           <a:p>
             <a:pPr lvl="0"/>
             <a:r>
-              <a:rPr lang="en-US" smtClean="0"/>
+              <a:rPr lang="en-US"/>
               <a:t>Click to edit Master text styles</a:t>
             </a:r>
           </a:p>
           <a:p>
             <a:pPr lvl="1"/>
             <a:r>
-              <a:rPr lang="en-US" smtClean="0"/>
+              <a:rPr lang="en-US"/>
               <a:t>Second level</a:t>
             </a:r>
           </a:p>
           <a:p>
             <a:pPr lvl="2"/>
             <a:r>
-              <a:rPr lang="en-US" smtClean="0"/>
+              <a:rPr lang="en-US"/>
               <a:t>Third level</a:t>
             </a:r>
           </a:p>
           <a:p>
             <a:pPr lvl="3"/>
             <a:r>
-              <a:rPr lang="en-US" smtClean="0"/>
+              <a:rPr lang="en-US"/>
               <a:t>Fourth level</a:t>
             </a:r>
           </a:p>
           <a:p>
             <a:pPr lvl="4"/>
             <a:r>
-              <a:rPr lang="en-US" smtClean="0"/>
+              <a:rPr lang="en-US"/>
               <a:t>Fifth level</a:t>
             </a:r>
-            <a:endParaRPr lang="en-US"/>
           </a:p>
         </p:txBody>
       </p:sp>
@@ -1797,7 +1802,7 @@
             <a:fld id="{1D8BD707-D9CF-40AE-B4C6-C98DA3205C09}" type="datetimeFigureOut">
               <a:rPr lang="en-US" smtClean="0"/>
               <a:pPr/>
-              <a:t>8/1/2011</a:t>
+              <a:t>10/26/2023</a:t>
             </a:fld>
             <a:endParaRPr lang="en-US"/>
           </a:p>
@@ -1840,7 +1845,7 @@
             <a:fld id="{B6F15528-21DE-4FAA-801E-634DDDAF4B2B}" type="slidenum">
               <a:rPr lang="en-US" smtClean="0"/>
               <a:pPr/>
-              <a:t>‹#›</a:t>
+              <a:t>‹nº›</a:t>
             </a:fld>
             <a:endParaRPr lang="en-US"/>
           </a:p>
@@ -1887,10 +1892,9 @@
           <a:lstStyle/>
           <a:p>
             <a:r>
-              <a:rPr lang="en-US" smtClean="0"/>
+              <a:rPr lang="en-US"/>
               <a:t>Click to edit Master title style</a:t>
             </a:r>
-            <a:endParaRPr lang="en-US"/>
           </a:p>
         </p:txBody>
       </p:sp>
@@ -1912,7 +1916,7 @@
             <a:fld id="{1D8BD707-D9CF-40AE-B4C6-C98DA3205C09}" type="datetimeFigureOut">
               <a:rPr lang="en-US" smtClean="0"/>
               <a:pPr/>
-              <a:t>8/1/2011</a:t>
+              <a:t>10/26/2023</a:t>
             </a:fld>
             <a:endParaRPr lang="en-US"/>
           </a:p>
@@ -1955,7 +1959,7 @@
             <a:fld id="{B6F15528-21DE-4FAA-801E-634DDDAF4B2B}" type="slidenum">
               <a:rPr lang="en-US" smtClean="0"/>
               <a:pPr/>
-              <a:t>‹#›</a:t>
+              <a:t>‹nº›</a:t>
             </a:fld>
             <a:endParaRPr lang="en-US"/>
           </a:p>
@@ -2004,7 +2008,7 @@
             <a:fld id="{1D8BD707-D9CF-40AE-B4C6-C98DA3205C09}" type="datetimeFigureOut">
               <a:rPr lang="en-US" smtClean="0"/>
               <a:pPr/>
-              <a:t>8/1/2011</a:t>
+              <a:t>10/26/2023</a:t>
             </a:fld>
             <a:endParaRPr lang="en-US"/>
           </a:p>
@@ -2047,7 +2051,7 @@
             <a:fld id="{B6F15528-21DE-4FAA-801E-634DDDAF4B2B}" type="slidenum">
               <a:rPr lang="en-US" smtClean="0"/>
               <a:pPr/>
-              <a:t>‹#›</a:t>
+              <a:t>‹nº›</a:t>
             </a:fld>
             <a:endParaRPr lang="en-US"/>
           </a:p>
@@ -2103,10 +2107,9 @@
           </a:lstStyle>
           <a:p>
             <a:r>
-              <a:rPr lang="en-US" smtClean="0"/>
+              <a:rPr lang="en-US"/>
               <a:t>Click to edit Master title style</a:t>
             </a:r>
-            <a:endParaRPr lang="en-US"/>
           </a:p>
         </p:txBody>
       </p:sp>
@@ -2160,38 +2163,37 @@
           <a:p>
             <a:pPr lvl="0"/>
             <a:r>
-              <a:rPr lang="en-US" smtClean="0"/>
+              <a:rPr lang="en-US"/>
               <a:t>Click to edit Master text styles</a:t>
             </a:r>
           </a:p>
           <a:p>
             <a:pPr lvl="1"/>
             <a:r>
-              <a:rPr lang="en-US" smtClean="0"/>
+              <a:rPr lang="en-US"/>
               <a:t>Second level</a:t>
             </a:r>
           </a:p>
           <a:p>
             <a:pPr lvl="2"/>
             <a:r>
-              <a:rPr lang="en-US" smtClean="0"/>
+              <a:rPr lang="en-US"/>
               <a:t>Third level</a:t>
             </a:r>
           </a:p>
           <a:p>
             <a:pPr lvl="3"/>
             <a:r>
-              <a:rPr lang="en-US" smtClean="0"/>
+              <a:rPr lang="en-US"/>
               <a:t>Fourth level</a:t>
             </a:r>
           </a:p>
           <a:p>
             <a:pPr lvl="4"/>
             <a:r>
-              <a:rPr lang="en-US" smtClean="0"/>
+              <a:rPr lang="en-US"/>
               <a:t>Fifth level</a:t>
             </a:r>
-            <a:endParaRPr lang="en-US"/>
           </a:p>
         </p:txBody>
       </p:sp>
@@ -2254,7 +2256,7 @@
           <a:p>
             <a:pPr lvl="0"/>
             <a:r>
-              <a:rPr lang="en-US" smtClean="0"/>
+              <a:rPr lang="en-US"/>
               <a:t>Click to edit Master text styles</a:t>
             </a:r>
           </a:p>
@@ -2278,7 +2280,7 @@
             <a:fld id="{1D8BD707-D9CF-40AE-B4C6-C98DA3205C09}" type="datetimeFigureOut">
               <a:rPr lang="en-US" smtClean="0"/>
               <a:pPr/>
-              <a:t>8/1/2011</a:t>
+              <a:t>10/26/2023</a:t>
             </a:fld>
             <a:endParaRPr lang="en-US"/>
           </a:p>
@@ -2321,7 +2323,7 @@
             <a:fld id="{B6F15528-21DE-4FAA-801E-634DDDAF4B2B}" type="slidenum">
               <a:rPr lang="en-US" smtClean="0"/>
               <a:pPr/>
-              <a:t>‹#›</a:t>
+              <a:t>‹nº›</a:t>
             </a:fld>
             <a:endParaRPr lang="en-US"/>
           </a:p>
@@ -2377,10 +2379,9 @@
           </a:lstStyle>
           <a:p>
             <a:r>
-              <a:rPr lang="en-US" smtClean="0"/>
+              <a:rPr lang="en-US"/>
               <a:t>Click to edit Master title style</a:t>
             </a:r>
-            <a:endParaRPr lang="en-US"/>
           </a:p>
         </p:txBody>
       </p:sp>
@@ -2504,7 +2505,7 @@
           <a:p>
             <a:pPr lvl="0"/>
             <a:r>
-              <a:rPr lang="en-US" smtClean="0"/>
+              <a:rPr lang="en-US"/>
               <a:t>Click to edit Master text styles</a:t>
             </a:r>
           </a:p>
@@ -2528,7 +2529,7 @@
             <a:fld id="{1D8BD707-D9CF-40AE-B4C6-C98DA3205C09}" type="datetimeFigureOut">
               <a:rPr lang="en-US" smtClean="0"/>
               <a:pPr/>
-              <a:t>8/1/2011</a:t>
+              <a:t>10/26/2023</a:t>
             </a:fld>
             <a:endParaRPr lang="en-US"/>
           </a:p>
@@ -2571,7 +2572,7 @@
             <a:fld id="{B6F15528-21DE-4FAA-801E-634DDDAF4B2B}" type="slidenum">
               <a:rPr lang="en-US" smtClean="0"/>
               <a:pPr/>
-              <a:t>‹#›</a:t>
+              <a:t>‹nº›</a:t>
             </a:fld>
             <a:endParaRPr lang="en-US"/>
           </a:p>
@@ -2633,10 +2634,9 @@
           <a:lstStyle/>
           <a:p>
             <a:r>
-              <a:rPr lang="en-US" smtClean="0"/>
+              <a:rPr lang="en-US"/>
               <a:t>Click to edit Master title style</a:t>
             </a:r>
-            <a:endParaRPr lang="en-US"/>
           </a:p>
         </p:txBody>
       </p:sp>
@@ -2667,38 +2667,37 @@
           <a:p>
             <a:pPr lvl="0"/>
             <a:r>
-              <a:rPr lang="en-US" smtClean="0"/>
+              <a:rPr lang="en-US"/>
               <a:t>Click to edit Master text styles</a:t>
             </a:r>
           </a:p>
           <a:p>
             <a:pPr lvl="1"/>
             <a:r>
-              <a:rPr lang="en-US" smtClean="0"/>
+              <a:rPr lang="en-US"/>
               <a:t>Second level</a:t>
             </a:r>
           </a:p>
           <a:p>
             <a:pPr lvl="2"/>
             <a:r>
-              <a:rPr lang="en-US" smtClean="0"/>
+              <a:rPr lang="en-US"/>
               <a:t>Third level</a:t>
             </a:r>
           </a:p>
           <a:p>
             <a:pPr lvl="3"/>
             <a:r>
-              <a:rPr lang="en-US" smtClean="0"/>
+              <a:rPr lang="en-US"/>
               <a:t>Fourth level</a:t>
             </a:r>
           </a:p>
           <a:p>
             <a:pPr lvl="4"/>
             <a:r>
-              <a:rPr lang="en-US" smtClean="0"/>
+              <a:rPr lang="en-US"/>
               <a:t>Fifth level</a:t>
             </a:r>
-            <a:endParaRPr lang="en-US"/>
           </a:p>
         </p:txBody>
       </p:sp>
@@ -2738,7 +2737,7 @@
             <a:fld id="{1D8BD707-D9CF-40AE-B4C6-C98DA3205C09}" type="datetimeFigureOut">
               <a:rPr lang="en-US" smtClean="0"/>
               <a:pPr/>
-              <a:t>8/1/2011</a:t>
+              <a:t>10/26/2023</a:t>
             </a:fld>
             <a:endParaRPr lang="en-US"/>
           </a:p>
@@ -2817,7 +2816,7 @@
             <a:fld id="{B6F15528-21DE-4FAA-801E-634DDDAF4B2B}" type="slidenum">
               <a:rPr lang="en-US" smtClean="0"/>
               <a:pPr/>
-              <a:t>‹#›</a:t>
+              <a:t>‹nº›</a:t>
             </a:fld>
             <a:endParaRPr lang="en-US"/>
           </a:p>
@@ -3093,7 +3092,7 @@
 </file>
 
 <file path=ppt/slides/slide1.xml><?xml version="1.0" encoding="utf-8"?>
-<p:sld xmlns:p="http://schemas.openxmlformats.org/presentationml/2006/main" xmlns:a="http://schemas.openxmlformats.org/drawingml/2006/main" xmlns:r="http://schemas.openxmlformats.org/officeDocument/2006/relationships">
+<p:sld xmlns:a="http://schemas.openxmlformats.org/drawingml/2006/main" xmlns:r="http://schemas.openxmlformats.org/officeDocument/2006/relationships" xmlns:p="http://schemas.openxmlformats.org/presentationml/2006/main">
   <p:cSld>
     <p:spTree>
       <p:nvGrpSpPr>
@@ -3111,12 +3110,12 @@
       </p:grpSpPr>
       <p:sp>
         <p:nvSpPr>
-          <p:cNvPr name="Freeform 2" id="2"/>
+          <p:cNvPr id="2" name="Freeform 2"/>
           <p:cNvSpPr/>
           <p:nvPr/>
         </p:nvSpPr>
         <p:spPr>
-          <a:xfrm flipH="false" flipV="false" rot="0">
+          <a:xfrm>
             <a:off x="10872651" y="2740879"/>
             <a:ext cx="2073492" cy="637167"/>
           </a:xfrm>
@@ -3125,9 +3124,9 @@
             <a:gdLst/>
             <a:ahLst/>
             <a:cxnLst/>
-            <a:rect r="r" b="b" t="t" l="l"/>
+            <a:rect l="l" t="t" r="r" b="b"/>
             <a:pathLst>
-              <a:path h="637167" w="2073492">
+              <a:path w="2073492" h="637167">
                 <a:moveTo>
                   <a:pt x="0" y="0"/>
                 </a:moveTo>
@@ -3150,19 +3149,26 @@
           <a:blipFill>
             <a:blip r:embed="rId2"/>
             <a:stretch>
-              <a:fillRect l="0" t="0" r="0" b="0"/>
+              <a:fillRect/>
             </a:stretch>
           </a:blipFill>
         </p:spPr>
-      </p:sp>
-      <p:sp>
-        <p:nvSpPr>
-          <p:cNvPr name="Freeform 3" id="3"/>
+        <p:txBody>
+          <a:bodyPr/>
+          <a:lstStyle/>
+          <a:p>
+            <a:endParaRPr lang="pt-BR"/>
+          </a:p>
+        </p:txBody>
+      </p:sp>
+      <p:sp>
+        <p:nvSpPr>
+          <p:cNvPr id="3" name="Freeform 3"/>
           <p:cNvSpPr/>
           <p:nvPr/>
         </p:nvSpPr>
         <p:spPr>
-          <a:xfrm flipH="false" flipV="false" rot="0">
+          <a:xfrm>
             <a:off x="15682408" y="7734189"/>
             <a:ext cx="1081332" cy="738009"/>
           </a:xfrm>
@@ -3171,9 +3177,9 @@
             <a:gdLst/>
             <a:ahLst/>
             <a:cxnLst/>
-            <a:rect r="r" b="b" t="t" l="l"/>
+            <a:rect l="l" t="t" r="r" b="b"/>
             <a:pathLst>
-              <a:path h="738009" w="1081332">
+              <a:path w="1081332" h="738009">
                 <a:moveTo>
                   <a:pt x="0" y="0"/>
                 </a:moveTo>
@@ -3202,20 +3208,27 @@
               </a:extLst>
             </a:blip>
             <a:stretch>
-              <a:fillRect l="0" t="0" r="0" b="0"/>
+              <a:fillRect/>
             </a:stretch>
           </a:blipFill>
         </p:spPr>
-      </p:sp>
-      <p:sp>
-        <p:nvSpPr>
-          <p:cNvPr name="Freeform 4" id="4"/>
+        <p:txBody>
+          <a:bodyPr/>
+          <a:lstStyle/>
+          <a:p>
+            <a:endParaRPr lang="pt-BR"/>
+          </a:p>
+        </p:txBody>
+      </p:sp>
+      <p:sp>
+        <p:nvSpPr>
+          <p:cNvPr id="4" name="Freeform 4"/>
           <p:cNvSpPr/>
           <p:nvPr/>
         </p:nvSpPr>
         <p:spPr>
-          <a:xfrm flipH="false" flipV="false" rot="0">
-            <a:off x="2439219" y="2694371"/>
+          <a:xfrm>
+            <a:off x="770954" y="2550424"/>
             <a:ext cx="2540215" cy="2540215"/>
           </a:xfrm>
           <a:custGeom>
@@ -3223,9 +3236,9 @@
             <a:gdLst/>
             <a:ahLst/>
             <a:cxnLst/>
-            <a:rect r="r" b="b" t="t" l="l"/>
+            <a:rect l="l" t="t" r="r" b="b"/>
             <a:pathLst>
-              <a:path h="2540215" w="2540215">
+              <a:path w="2540215" h="2540215">
                 <a:moveTo>
                   <a:pt x="0" y="0"/>
                 </a:moveTo>
@@ -3248,19 +3261,26 @@
           <a:blipFill>
             <a:blip r:embed="rId5"/>
             <a:stretch>
-              <a:fillRect l="0" t="0" r="0" b="0"/>
+              <a:fillRect/>
             </a:stretch>
           </a:blipFill>
         </p:spPr>
-      </p:sp>
-      <p:sp>
-        <p:nvSpPr>
-          <p:cNvPr name="Freeform 5" id="5"/>
+        <p:txBody>
+          <a:bodyPr/>
+          <a:lstStyle/>
+          <a:p>
+            <a:endParaRPr lang="pt-BR"/>
+          </a:p>
+        </p:txBody>
+      </p:sp>
+      <p:sp>
+        <p:nvSpPr>
+          <p:cNvPr id="5" name="Freeform 5"/>
           <p:cNvSpPr/>
           <p:nvPr/>
         </p:nvSpPr>
         <p:spPr>
-          <a:xfrm flipH="false" flipV="false" rot="0">
+          <a:xfrm>
             <a:off x="6118590" y="2618290"/>
             <a:ext cx="1119487" cy="1119487"/>
           </a:xfrm>
@@ -3269,9 +3289,9 @@
             <a:gdLst/>
             <a:ahLst/>
             <a:cxnLst/>
-            <a:rect r="r" b="b" t="t" l="l"/>
+            <a:rect l="l" t="t" r="r" b="b"/>
             <a:pathLst>
-              <a:path h="1119487" w="1119487">
+              <a:path w="1119487" h="1119487">
                 <a:moveTo>
                   <a:pt x="0" y="0"/>
                 </a:moveTo>
@@ -3294,19 +3314,26 @@
           <a:blipFill>
             <a:blip r:embed="rId6"/>
             <a:stretch>
-              <a:fillRect l="0" t="0" r="0" b="0"/>
+              <a:fillRect/>
             </a:stretch>
           </a:blipFill>
         </p:spPr>
-      </p:sp>
-      <p:sp>
-        <p:nvSpPr>
-          <p:cNvPr name="Freeform 6" id="6"/>
+        <p:txBody>
+          <a:bodyPr/>
+          <a:lstStyle/>
+          <a:p>
+            <a:endParaRPr lang="pt-BR"/>
+          </a:p>
+        </p:txBody>
+      </p:sp>
+      <p:sp>
+        <p:nvSpPr>
+          <p:cNvPr id="6" name="Freeform 6"/>
           <p:cNvSpPr/>
           <p:nvPr/>
         </p:nvSpPr>
         <p:spPr>
-          <a:xfrm flipH="false" flipV="false" rot="0">
+          <a:xfrm>
             <a:off x="10979451" y="3538881"/>
             <a:ext cx="2210903" cy="1659135"/>
           </a:xfrm>
@@ -3315,9 +3342,9 @@
             <a:gdLst/>
             <a:ahLst/>
             <a:cxnLst/>
-            <a:rect r="r" b="b" t="t" l="l"/>
+            <a:rect l="l" t="t" r="r" b="b"/>
             <a:pathLst>
-              <a:path h="1659135" w="2210903">
+              <a:path w="2210903" h="1659135">
                 <a:moveTo>
                   <a:pt x="0" y="0"/>
                 </a:moveTo>
@@ -3340,19 +3367,26 @@
           <a:blipFill>
             <a:blip r:embed="rId7"/>
             <a:stretch>
-              <a:fillRect l="0" t="0" r="0" b="0"/>
+              <a:fillRect/>
             </a:stretch>
           </a:blipFill>
         </p:spPr>
-      </p:sp>
-      <p:sp>
-        <p:nvSpPr>
-          <p:cNvPr name="Freeform 7" id="7"/>
+        <p:txBody>
+          <a:bodyPr/>
+          <a:lstStyle/>
+          <a:p>
+            <a:endParaRPr lang="pt-BR"/>
+          </a:p>
+        </p:txBody>
+      </p:sp>
+      <p:sp>
+        <p:nvSpPr>
+          <p:cNvPr id="7" name="Freeform 7"/>
           <p:cNvSpPr/>
           <p:nvPr/>
         </p:nvSpPr>
         <p:spPr>
-          <a:xfrm flipH="false" flipV="false" rot="0">
+          <a:xfrm>
             <a:off x="14376876" y="6869918"/>
             <a:ext cx="1746258" cy="1310450"/>
           </a:xfrm>
@@ -3361,9 +3395,9 @@
             <a:gdLst/>
             <a:ahLst/>
             <a:cxnLst/>
-            <a:rect r="r" b="b" t="t" l="l"/>
+            <a:rect l="l" t="t" r="r" b="b"/>
             <a:pathLst>
-              <a:path h="1310450" w="1746258">
+              <a:path w="1746258" h="1310450">
                 <a:moveTo>
                   <a:pt x="0" y="0"/>
                 </a:moveTo>
@@ -3386,19 +3420,26 @@
           <a:blipFill>
             <a:blip r:embed="rId7"/>
             <a:stretch>
-              <a:fillRect l="0" t="0" r="0" b="0"/>
+              <a:fillRect/>
             </a:stretch>
           </a:blipFill>
         </p:spPr>
-      </p:sp>
-      <p:sp>
-        <p:nvSpPr>
-          <p:cNvPr name="Freeform 8" id="8"/>
+        <p:txBody>
+          <a:bodyPr/>
+          <a:lstStyle/>
+          <a:p>
+            <a:endParaRPr lang="pt-BR"/>
+          </a:p>
+        </p:txBody>
+      </p:sp>
+      <p:sp>
+        <p:nvSpPr>
+          <p:cNvPr id="8" name="Freeform 8"/>
           <p:cNvSpPr/>
           <p:nvPr/>
         </p:nvSpPr>
         <p:spPr>
-          <a:xfrm flipH="false" flipV="false" rot="0">
+          <a:xfrm>
             <a:off x="12946143" y="3284437"/>
             <a:ext cx="1914003" cy="1203861"/>
           </a:xfrm>
@@ -3407,9 +3448,9 @@
             <a:gdLst/>
             <a:ahLst/>
             <a:cxnLst/>
-            <a:rect r="r" b="b" t="t" l="l"/>
+            <a:rect l="l" t="t" r="r" b="b"/>
             <a:pathLst>
-              <a:path h="1203861" w="1914003">
+              <a:path w="1914003" h="1203861">
                 <a:moveTo>
                   <a:pt x="0" y="0"/>
                 </a:moveTo>
@@ -3432,19 +3473,26 @@
           <a:blipFill>
             <a:blip r:embed="rId8"/>
             <a:stretch>
-              <a:fillRect l="0" t="0" r="0" b="0"/>
+              <a:fillRect/>
             </a:stretch>
           </a:blipFill>
         </p:spPr>
-      </p:sp>
-      <p:sp>
-        <p:nvSpPr>
-          <p:cNvPr name="Freeform 9" id="9"/>
+        <p:txBody>
+          <a:bodyPr/>
+          <a:lstStyle/>
+          <a:p>
+            <a:endParaRPr lang="pt-BR"/>
+          </a:p>
+        </p:txBody>
+      </p:sp>
+      <p:sp>
+        <p:nvSpPr>
+          <p:cNvPr id="9" name="Freeform 9"/>
           <p:cNvSpPr/>
           <p:nvPr/>
         </p:nvSpPr>
         <p:spPr>
-          <a:xfrm flipH="false" flipV="false" rot="0">
+          <a:xfrm>
             <a:off x="8878332" y="2926710"/>
             <a:ext cx="2214397" cy="2214397"/>
           </a:xfrm>
@@ -3453,9 +3501,9 @@
             <a:gdLst/>
             <a:ahLst/>
             <a:cxnLst/>
-            <a:rect r="r" b="b" t="t" l="l"/>
+            <a:rect l="l" t="t" r="r" b="b"/>
             <a:pathLst>
-              <a:path h="2214397" w="2214397">
+              <a:path w="2214397" h="2214397">
                 <a:moveTo>
                   <a:pt x="0" y="0"/>
                 </a:moveTo>
@@ -3478,20 +3526,27 @@
           <a:blipFill>
             <a:blip r:embed="rId9"/>
             <a:stretch>
-              <a:fillRect l="0" t="0" r="0" b="0"/>
+              <a:fillRect/>
             </a:stretch>
           </a:blipFill>
         </p:spPr>
-      </p:sp>
-      <p:sp>
-        <p:nvSpPr>
-          <p:cNvPr name="Freeform 10" id="10"/>
+        <p:txBody>
+          <a:bodyPr/>
+          <a:lstStyle/>
+          <a:p>
+            <a:endParaRPr lang="pt-BR"/>
+          </a:p>
+        </p:txBody>
+      </p:sp>
+      <p:sp>
+        <p:nvSpPr>
+          <p:cNvPr id="10" name="Freeform 10"/>
           <p:cNvSpPr/>
           <p:nvPr/>
         </p:nvSpPr>
         <p:spPr>
-          <a:xfrm flipH="false" flipV="false" rot="0">
-            <a:off x="13896772" y="6289258"/>
+          <a:xfrm>
+            <a:off x="14001334" y="6317557"/>
             <a:ext cx="3571271" cy="3571271"/>
           </a:xfrm>
           <a:custGeom>
@@ -3499,9 +3554,9 @@
             <a:gdLst/>
             <a:ahLst/>
             <a:cxnLst/>
-            <a:rect r="r" b="b" t="t" l="l"/>
+            <a:rect l="l" t="t" r="r" b="b"/>
             <a:pathLst>
-              <a:path h="3571271" w="3571271">
+              <a:path w="3571271" h="3571271">
                 <a:moveTo>
                   <a:pt x="0" y="0"/>
                 </a:moveTo>
@@ -3524,19 +3579,26 @@
           <a:blipFill>
             <a:blip r:embed="rId10"/>
             <a:stretch>
-              <a:fillRect l="0" t="0" r="0" b="0"/>
+              <a:fillRect/>
             </a:stretch>
           </a:blipFill>
         </p:spPr>
-      </p:sp>
-      <p:sp>
-        <p:nvSpPr>
-          <p:cNvPr name="Freeform 11" id="11"/>
+        <p:txBody>
+          <a:bodyPr/>
+          <a:lstStyle/>
+          <a:p>
+            <a:endParaRPr lang="pt-BR"/>
+          </a:p>
+        </p:txBody>
+      </p:sp>
+      <p:sp>
+        <p:nvSpPr>
+          <p:cNvPr id="11" name="Freeform 11"/>
           <p:cNvSpPr/>
           <p:nvPr/>
         </p:nvSpPr>
         <p:spPr>
-          <a:xfrm flipH="false" flipV="false" rot="0">
+          <a:xfrm>
             <a:off x="9439751" y="7655142"/>
             <a:ext cx="2504396" cy="1773771"/>
           </a:xfrm>
@@ -3545,9 +3607,9 @@
             <a:gdLst/>
             <a:ahLst/>
             <a:cxnLst/>
-            <a:rect r="r" b="b" t="t" l="l"/>
+            <a:rect l="l" t="t" r="r" b="b"/>
             <a:pathLst>
-              <a:path h="1773771" w="2504396">
+              <a:path w="2504396" h="1773771">
                 <a:moveTo>
                   <a:pt x="0" y="0"/>
                 </a:moveTo>
@@ -3570,19 +3632,26 @@
           <a:blipFill>
             <a:blip r:embed="rId11"/>
             <a:stretch>
-              <a:fillRect l="0" t="0" r="0" b="0"/>
+              <a:fillRect/>
             </a:stretch>
           </a:blipFill>
         </p:spPr>
-      </p:sp>
-      <p:sp>
-        <p:nvSpPr>
-          <p:cNvPr name="Freeform 12" id="12"/>
+        <p:txBody>
+          <a:bodyPr/>
+          <a:lstStyle/>
+          <a:p>
+            <a:endParaRPr lang="pt-BR"/>
+          </a:p>
+        </p:txBody>
+      </p:sp>
+      <p:sp>
+        <p:nvSpPr>
+          <p:cNvPr id="12" name="Freeform 12"/>
           <p:cNvSpPr/>
           <p:nvPr/>
         </p:nvSpPr>
         <p:spPr>
-          <a:xfrm flipH="false" flipV="false" rot="0">
+          <a:xfrm>
             <a:off x="8032845" y="7637068"/>
             <a:ext cx="902081" cy="1650617"/>
           </a:xfrm>
@@ -3591,9 +3660,9 @@
             <a:gdLst/>
             <a:ahLst/>
             <a:cxnLst/>
-            <a:rect r="r" b="b" t="t" l="l"/>
+            <a:rect l="l" t="t" r="r" b="b"/>
             <a:pathLst>
-              <a:path h="1650617" w="902081">
+              <a:path w="902081" h="1650617">
                 <a:moveTo>
                   <a:pt x="0" y="0"/>
                 </a:moveTo>
@@ -3616,19 +3685,26 @@
           <a:blipFill>
             <a:blip r:embed="rId12"/>
             <a:stretch>
-              <a:fillRect l="0" t="0" r="0" b="0"/>
+              <a:fillRect/>
             </a:stretch>
           </a:blipFill>
         </p:spPr>
-      </p:sp>
-      <p:sp>
-        <p:nvSpPr>
-          <p:cNvPr name="Freeform 13" id="13"/>
+        <p:txBody>
+          <a:bodyPr/>
+          <a:lstStyle/>
+          <a:p>
+            <a:endParaRPr lang="pt-BR"/>
+          </a:p>
+        </p:txBody>
+      </p:sp>
+      <p:sp>
+        <p:nvSpPr>
+          <p:cNvPr id="13" name="Freeform 13"/>
           <p:cNvSpPr/>
           <p:nvPr/>
         </p:nvSpPr>
         <p:spPr>
-          <a:xfrm flipH="false" flipV="false" rot="0">
+          <a:xfrm>
             <a:off x="6937105" y="7918792"/>
             <a:ext cx="602035" cy="1428430"/>
           </a:xfrm>
@@ -3637,9 +3713,9 @@
             <a:gdLst/>
             <a:ahLst/>
             <a:cxnLst/>
-            <a:rect r="r" b="b" t="t" l="l"/>
+            <a:rect l="l" t="t" r="r" b="b"/>
             <a:pathLst>
-              <a:path h="1428430" w="602035">
+              <a:path w="602035" h="1428430">
                 <a:moveTo>
                   <a:pt x="0" y="0"/>
                 </a:moveTo>
@@ -3662,19 +3738,26 @@
           <a:blipFill>
             <a:blip r:embed="rId13"/>
             <a:stretch>
-              <a:fillRect l="0" t="0" r="0" b="0"/>
+              <a:fillRect/>
             </a:stretch>
           </a:blipFill>
         </p:spPr>
-      </p:sp>
-      <p:sp>
-        <p:nvSpPr>
-          <p:cNvPr name="Freeform 14" id="14"/>
+        <p:txBody>
+          <a:bodyPr/>
+          <a:lstStyle/>
+          <a:p>
+            <a:endParaRPr lang="pt-BR"/>
+          </a:p>
+        </p:txBody>
+      </p:sp>
+      <p:sp>
+        <p:nvSpPr>
+          <p:cNvPr id="14" name="Freeform 14"/>
           <p:cNvSpPr/>
           <p:nvPr/>
         </p:nvSpPr>
         <p:spPr>
-          <a:xfrm flipH="false" flipV="false" rot="0">
+          <a:xfrm>
             <a:off x="7845349" y="787578"/>
             <a:ext cx="8299012" cy="5502606"/>
           </a:xfrm>
@@ -3683,9 +3766,9 @@
             <a:gdLst/>
             <a:ahLst/>
             <a:cxnLst/>
-            <a:rect r="r" b="b" t="t" l="l"/>
+            <a:rect l="l" t="t" r="r" b="b"/>
             <a:pathLst>
-              <a:path h="5502606" w="8299012">
+              <a:path w="8299012" h="5502606">
                 <a:moveTo>
                   <a:pt x="0" y="0"/>
                 </a:moveTo>
@@ -3708,19 +3791,26 @@
           <a:blipFill>
             <a:blip r:embed="rId14"/>
             <a:stretch>
-              <a:fillRect l="0" t="0" r="0" b="0"/>
+              <a:fillRect/>
             </a:stretch>
           </a:blipFill>
         </p:spPr>
-      </p:sp>
-      <p:sp>
-        <p:nvSpPr>
-          <p:cNvPr name="Freeform 15" id="15"/>
+        <p:txBody>
+          <a:bodyPr/>
+          <a:lstStyle/>
+          <a:p>
+            <a:endParaRPr lang="pt-BR"/>
+          </a:p>
+        </p:txBody>
+      </p:sp>
+      <p:sp>
+        <p:nvSpPr>
+          <p:cNvPr id="15" name="Freeform 15"/>
           <p:cNvSpPr/>
           <p:nvPr/>
         </p:nvSpPr>
         <p:spPr>
-          <a:xfrm flipH="false" flipV="false" rot="0">
+          <a:xfrm>
             <a:off x="184939" y="6751284"/>
             <a:ext cx="4508561" cy="2305002"/>
           </a:xfrm>
@@ -3729,9 +3819,9 @@
             <a:gdLst/>
             <a:ahLst/>
             <a:cxnLst/>
-            <a:rect r="r" b="b" t="t" l="l"/>
+            <a:rect l="l" t="t" r="r" b="b"/>
             <a:pathLst>
-              <a:path h="2305002" w="4508561">
+              <a:path w="4508561" h="2305002">
                 <a:moveTo>
                   <a:pt x="0" y="0"/>
                 </a:moveTo>
@@ -3760,19 +3850,26 @@
               </a:extLst>
             </a:blip>
             <a:stretch>
-              <a:fillRect l="0" t="0" r="0" b="0"/>
+              <a:fillRect/>
             </a:stretch>
           </a:blipFill>
         </p:spPr>
-      </p:sp>
-      <p:sp>
-        <p:nvSpPr>
-          <p:cNvPr name="Freeform 16" id="16"/>
+        <p:txBody>
+          <a:bodyPr/>
+          <a:lstStyle/>
+          <a:p>
+            <a:endParaRPr lang="pt-BR"/>
+          </a:p>
+        </p:txBody>
+      </p:sp>
+      <p:sp>
+        <p:nvSpPr>
+          <p:cNvPr id="16" name="Freeform 16"/>
           <p:cNvSpPr/>
           <p:nvPr/>
         </p:nvSpPr>
         <p:spPr>
-          <a:xfrm flipH="false" flipV="false" rot="0">
+          <a:xfrm>
             <a:off x="3915080" y="7940524"/>
             <a:ext cx="1187004" cy="1047941"/>
           </a:xfrm>
@@ -3781,9 +3878,9 @@
             <a:gdLst/>
             <a:ahLst/>
             <a:cxnLst/>
-            <a:rect r="r" b="b" t="t" l="l"/>
+            <a:rect l="l" t="t" r="r" b="b"/>
             <a:pathLst>
-              <a:path h="1047941" w="1187004">
+              <a:path w="1187004" h="1047941">
                 <a:moveTo>
                   <a:pt x="0" y="0"/>
                 </a:moveTo>
@@ -3806,19 +3903,26 @@
           <a:blipFill>
             <a:blip r:embed="rId17"/>
             <a:stretch>
-              <a:fillRect l="0" t="0" r="0" b="0"/>
+              <a:fillRect/>
             </a:stretch>
           </a:blipFill>
         </p:spPr>
-      </p:sp>
-      <p:sp>
-        <p:nvSpPr>
-          <p:cNvPr name="Freeform 17" id="17"/>
+        <p:txBody>
+          <a:bodyPr/>
+          <a:lstStyle/>
+          <a:p>
+            <a:endParaRPr lang="pt-BR"/>
+          </a:p>
+        </p:txBody>
+      </p:sp>
+      <p:sp>
+        <p:nvSpPr>
+          <p:cNvPr id="17" name="Freeform 17"/>
           <p:cNvSpPr/>
           <p:nvPr/>
         </p:nvSpPr>
         <p:spPr>
-          <a:xfrm flipH="false" flipV="false" rot="0">
+          <a:xfrm>
             <a:off x="8032845" y="6350996"/>
             <a:ext cx="1037845" cy="1037845"/>
           </a:xfrm>
@@ -3827,9 +3931,9 @@
             <a:gdLst/>
             <a:ahLst/>
             <a:cxnLst/>
-            <a:rect r="r" b="b" t="t" l="l"/>
+            <a:rect l="l" t="t" r="r" b="b"/>
             <a:pathLst>
-              <a:path h="1037845" w="1037845">
+              <a:path w="1037845" h="1037845">
                 <a:moveTo>
                   <a:pt x="0" y="0"/>
                 </a:moveTo>
@@ -3852,19 +3956,26 @@
           <a:blipFill>
             <a:blip r:embed="rId18"/>
             <a:stretch>
-              <a:fillRect l="0" t="0" r="0" b="0"/>
+              <a:fillRect/>
             </a:stretch>
           </a:blipFill>
         </p:spPr>
-      </p:sp>
-      <p:sp>
-        <p:nvSpPr>
-          <p:cNvPr name="Freeform 18" id="18"/>
+        <p:txBody>
+          <a:bodyPr/>
+          <a:lstStyle/>
+          <a:p>
+            <a:endParaRPr lang="pt-BR"/>
+          </a:p>
+        </p:txBody>
+      </p:sp>
+      <p:sp>
+        <p:nvSpPr>
+          <p:cNvPr id="18" name="Freeform 18"/>
           <p:cNvSpPr/>
           <p:nvPr/>
         </p:nvSpPr>
         <p:spPr>
-          <a:xfrm flipH="false" flipV="false" rot="0">
+          <a:xfrm>
             <a:off x="15800514" y="5170697"/>
             <a:ext cx="1119487" cy="1119487"/>
           </a:xfrm>
@@ -3873,9 +3984,9 @@
             <a:gdLst/>
             <a:ahLst/>
             <a:cxnLst/>
-            <a:rect r="r" b="b" t="t" l="l"/>
+            <a:rect l="l" t="t" r="r" b="b"/>
             <a:pathLst>
-              <a:path h="1119487" w="1119487">
+              <a:path w="1119487" h="1119487">
                 <a:moveTo>
                   <a:pt x="0" y="0"/>
                 </a:moveTo>
@@ -3898,19 +4009,26 @@
           <a:blipFill>
             <a:blip r:embed="rId6"/>
             <a:stretch>
-              <a:fillRect l="0" t="0" r="0" b="0"/>
+              <a:fillRect/>
             </a:stretch>
           </a:blipFill>
         </p:spPr>
-      </p:sp>
-      <p:sp>
-        <p:nvSpPr>
-          <p:cNvPr name="Freeform 19" id="19"/>
+        <p:txBody>
+          <a:bodyPr/>
+          <a:lstStyle/>
+          <a:p>
+            <a:endParaRPr lang="pt-BR"/>
+          </a:p>
+        </p:txBody>
+      </p:sp>
+      <p:sp>
+        <p:nvSpPr>
+          <p:cNvPr id="19" name="Freeform 19"/>
           <p:cNvSpPr/>
           <p:nvPr/>
         </p:nvSpPr>
         <p:spPr>
-          <a:xfrm flipH="false" flipV="false" rot="0">
+          <a:xfrm>
             <a:off x="3211646" y="7917700"/>
             <a:ext cx="1204098" cy="1063033"/>
           </a:xfrm>
@@ -3919,9 +4037,9 @@
             <a:gdLst/>
             <a:ahLst/>
             <a:cxnLst/>
-            <a:rect r="r" b="b" t="t" l="l"/>
+            <a:rect l="l" t="t" r="r" b="b"/>
             <a:pathLst>
-              <a:path h="1063033" w="1204098">
+              <a:path w="1204098" h="1063033">
                 <a:moveTo>
                   <a:pt x="0" y="0"/>
                 </a:moveTo>
@@ -3944,19 +4062,26 @@
           <a:blipFill>
             <a:blip r:embed="rId17"/>
             <a:stretch>
-              <a:fillRect l="0" t="0" r="0" b="0"/>
+              <a:fillRect/>
             </a:stretch>
           </a:blipFill>
         </p:spPr>
-      </p:sp>
-      <p:sp>
-        <p:nvSpPr>
-          <p:cNvPr name="Freeform 20" id="20"/>
+        <p:txBody>
+          <a:bodyPr/>
+          <a:lstStyle/>
+          <a:p>
+            <a:endParaRPr lang="pt-BR"/>
+          </a:p>
+        </p:txBody>
+      </p:sp>
+      <p:sp>
+        <p:nvSpPr>
+          <p:cNvPr id="20" name="Freeform 20"/>
           <p:cNvSpPr/>
           <p:nvPr/>
         </p:nvSpPr>
         <p:spPr>
-          <a:xfrm flipH="false" flipV="false" rot="0">
+          <a:xfrm>
             <a:off x="7057966" y="6199097"/>
             <a:ext cx="494826" cy="1552396"/>
           </a:xfrm>
@@ -3965,9 +4090,9 @@
             <a:gdLst/>
             <a:ahLst/>
             <a:cxnLst/>
-            <a:rect r="r" b="b" t="t" l="l"/>
+            <a:rect l="l" t="t" r="r" b="b"/>
             <a:pathLst>
-              <a:path h="1552396" w="494826">
+              <a:path w="494826" h="1552396">
                 <a:moveTo>
                   <a:pt x="0" y="0"/>
                 </a:moveTo>
@@ -3990,19 +4115,26 @@
           <a:blipFill>
             <a:blip r:embed="rId19"/>
             <a:stretch>
-              <a:fillRect l="0" t="0" r="0" b="0"/>
+              <a:fillRect/>
             </a:stretch>
           </a:blipFill>
         </p:spPr>
-      </p:sp>
-      <p:sp>
-        <p:nvSpPr>
-          <p:cNvPr name="Freeform 21" id="21"/>
+        <p:txBody>
+          <a:bodyPr/>
+          <a:lstStyle/>
+          <a:p>
+            <a:endParaRPr lang="pt-BR"/>
+          </a:p>
+        </p:txBody>
+      </p:sp>
+      <p:sp>
+        <p:nvSpPr>
+          <p:cNvPr id="21" name="Freeform 21"/>
           <p:cNvSpPr/>
           <p:nvPr/>
         </p:nvSpPr>
         <p:spPr>
-          <a:xfrm flipH="false" flipV="false" rot="5400000">
+          <a:xfrm rot="5400000">
             <a:off x="12458394" y="7520986"/>
             <a:ext cx="1564171" cy="1737968"/>
           </a:xfrm>
@@ -4011,9 +4143,9 @@
             <a:gdLst/>
             <a:ahLst/>
             <a:cxnLst/>
-            <a:rect r="r" b="b" t="t" l="l"/>
+            <a:rect l="l" t="t" r="r" b="b"/>
             <a:pathLst>
-              <a:path h="1737968" w="1564171">
+              <a:path w="1564171" h="1737968">
                 <a:moveTo>
                   <a:pt x="0" y="0"/>
                 </a:moveTo>
@@ -4042,19 +4174,26 @@
               </a:extLst>
             </a:blip>
             <a:stretch>
-              <a:fillRect l="0" t="0" r="0" b="0"/>
+              <a:fillRect/>
             </a:stretch>
           </a:blipFill>
         </p:spPr>
-      </p:sp>
-      <p:sp>
-        <p:nvSpPr>
-          <p:cNvPr name="Freeform 22" id="22"/>
+        <p:txBody>
+          <a:bodyPr/>
+          <a:lstStyle/>
+          <a:p>
+            <a:endParaRPr lang="pt-BR"/>
+          </a:p>
+        </p:txBody>
+      </p:sp>
+      <p:sp>
+        <p:nvSpPr>
+          <p:cNvPr id="22" name="Freeform 22"/>
           <p:cNvSpPr/>
           <p:nvPr/>
         </p:nvSpPr>
         <p:spPr>
-          <a:xfrm flipH="false" flipV="false" rot="0">
+          <a:xfrm>
             <a:off x="2024559" y="8389970"/>
             <a:ext cx="2668941" cy="621135"/>
           </a:xfrm>
@@ -4063,9 +4202,9 @@
             <a:gdLst/>
             <a:ahLst/>
             <a:cxnLst/>
-            <a:rect r="r" b="b" t="t" l="l"/>
+            <a:rect l="l" t="t" r="r" b="b"/>
             <a:pathLst>
-              <a:path h="621135" w="2668941">
+              <a:path w="2668941" h="621135">
                 <a:moveTo>
                   <a:pt x="0" y="0"/>
                 </a:moveTo>
@@ -4094,19 +4233,26 @@
               </a:extLst>
             </a:blip>
             <a:stretch>
-              <a:fillRect l="0" t="0" r="0" b="0"/>
+              <a:fillRect/>
             </a:stretch>
           </a:blipFill>
         </p:spPr>
-      </p:sp>
-      <p:sp>
-        <p:nvSpPr>
-          <p:cNvPr name="Freeform 23" id="23"/>
+        <p:txBody>
+          <a:bodyPr/>
+          <a:lstStyle/>
+          <a:p>
+            <a:endParaRPr lang="pt-BR"/>
+          </a:p>
+        </p:txBody>
+      </p:sp>
+      <p:sp>
+        <p:nvSpPr>
+          <p:cNvPr id="23" name="Freeform 23"/>
           <p:cNvSpPr/>
           <p:nvPr/>
         </p:nvSpPr>
         <p:spPr>
-          <a:xfrm flipH="false" flipV="false" rot="0">
+          <a:xfrm>
             <a:off x="2274947" y="7923072"/>
             <a:ext cx="1206772" cy="1065393"/>
           </a:xfrm>
@@ -4115,9 +4261,9 @@
             <a:gdLst/>
             <a:ahLst/>
             <a:cxnLst/>
-            <a:rect r="r" b="b" t="t" l="l"/>
+            <a:rect l="l" t="t" r="r" b="b"/>
             <a:pathLst>
-              <a:path h="1065393" w="1206772">
+              <a:path w="1206772" h="1065393">
                 <a:moveTo>
                   <a:pt x="0" y="0"/>
                 </a:moveTo>
@@ -4140,19 +4286,26 @@
           <a:blipFill>
             <a:blip r:embed="rId17"/>
             <a:stretch>
-              <a:fillRect l="0" t="0" r="0" b="0"/>
+              <a:fillRect/>
             </a:stretch>
           </a:blipFill>
         </p:spPr>
-      </p:sp>
-      <p:sp>
-        <p:nvSpPr>
-          <p:cNvPr name="Freeform 24" id="24"/>
+        <p:txBody>
+          <a:bodyPr/>
+          <a:lstStyle/>
+          <a:p>
+            <a:endParaRPr lang="pt-BR"/>
+          </a:p>
+        </p:txBody>
+      </p:sp>
+      <p:sp>
+        <p:nvSpPr>
+          <p:cNvPr id="24" name="Freeform 24"/>
           <p:cNvSpPr/>
           <p:nvPr/>
         </p:nvSpPr>
         <p:spPr>
-          <a:xfrm flipH="false" flipV="false" rot="0">
+          <a:xfrm>
             <a:off x="2685517" y="7923072"/>
             <a:ext cx="1206772" cy="1065393"/>
           </a:xfrm>
@@ -4161,9 +4314,9 @@
             <a:gdLst/>
             <a:ahLst/>
             <a:cxnLst/>
-            <a:rect r="r" b="b" t="t" l="l"/>
+            <a:rect l="l" t="t" r="r" b="b"/>
             <a:pathLst>
-              <a:path h="1065393" w="1206772">
+              <a:path w="1206772" h="1065393">
                 <a:moveTo>
                   <a:pt x="0" y="0"/>
                 </a:moveTo>
@@ -4186,19 +4339,26 @@
           <a:blipFill>
             <a:blip r:embed="rId17"/>
             <a:stretch>
-              <a:fillRect l="0" t="0" r="0" b="0"/>
+              <a:fillRect/>
             </a:stretch>
           </a:blipFill>
         </p:spPr>
-      </p:sp>
-      <p:sp>
-        <p:nvSpPr>
-          <p:cNvPr name="Freeform 25" id="25"/>
+        <p:txBody>
+          <a:bodyPr/>
+          <a:lstStyle/>
+          <a:p>
+            <a:endParaRPr lang="pt-BR"/>
+          </a:p>
+        </p:txBody>
+      </p:sp>
+      <p:sp>
+        <p:nvSpPr>
+          <p:cNvPr id="25" name="Freeform 25"/>
           <p:cNvSpPr/>
           <p:nvPr/>
         </p:nvSpPr>
         <p:spPr>
-          <a:xfrm flipH="false" flipV="false" rot="0">
+          <a:xfrm>
             <a:off x="1866046" y="7923072"/>
             <a:ext cx="1206772" cy="1065393"/>
           </a:xfrm>
@@ -4207,9 +4367,9 @@
             <a:gdLst/>
             <a:ahLst/>
             <a:cxnLst/>
-            <a:rect r="r" b="b" t="t" l="l"/>
+            <a:rect l="l" t="t" r="r" b="b"/>
             <a:pathLst>
-              <a:path h="1065393" w="1206772">
+              <a:path w="1206772" h="1065393">
                 <a:moveTo>
                   <a:pt x="0" y="0"/>
                 </a:moveTo>
@@ -4232,19 +4392,26 @@
           <a:blipFill>
             <a:blip r:embed="rId17"/>
             <a:stretch>
-              <a:fillRect l="0" t="0" r="0" b="0"/>
+              <a:fillRect/>
             </a:stretch>
           </a:blipFill>
         </p:spPr>
-      </p:sp>
-      <p:sp>
-        <p:nvSpPr>
-          <p:cNvPr name="Freeform 26" id="26"/>
+        <p:txBody>
+          <a:bodyPr/>
+          <a:lstStyle/>
+          <a:p>
+            <a:endParaRPr lang="pt-BR"/>
+          </a:p>
+        </p:txBody>
+      </p:sp>
+      <p:sp>
+        <p:nvSpPr>
+          <p:cNvPr id="26" name="Freeform 26"/>
           <p:cNvSpPr/>
           <p:nvPr/>
         </p:nvSpPr>
         <p:spPr>
-          <a:xfrm flipH="false" flipV="false" rot="0">
+          <a:xfrm>
             <a:off x="3597571" y="7902454"/>
             <a:ext cx="1206772" cy="1065393"/>
           </a:xfrm>
@@ -4253,9 +4420,9 @@
             <a:gdLst/>
             <a:ahLst/>
             <a:cxnLst/>
-            <a:rect r="r" b="b" t="t" l="l"/>
+            <a:rect l="l" t="t" r="r" b="b"/>
             <a:pathLst>
-              <a:path h="1065393" w="1206772">
+              <a:path w="1206772" h="1065393">
                 <a:moveTo>
                   <a:pt x="0" y="0"/>
                 </a:moveTo>
@@ -4278,19 +4445,26 @@
           <a:blipFill>
             <a:blip r:embed="rId17"/>
             <a:stretch>
-              <a:fillRect l="0" t="0" r="0" b="0"/>
+              <a:fillRect/>
             </a:stretch>
           </a:blipFill>
         </p:spPr>
-      </p:sp>
-      <p:sp>
-        <p:nvSpPr>
-          <p:cNvPr name="Freeform 27" id="27"/>
+        <p:txBody>
+          <a:bodyPr/>
+          <a:lstStyle/>
+          <a:p>
+            <a:endParaRPr lang="pt-BR"/>
+          </a:p>
+        </p:txBody>
+      </p:sp>
+      <p:sp>
+        <p:nvSpPr>
+          <p:cNvPr id="27" name="Freeform 27"/>
           <p:cNvSpPr/>
           <p:nvPr/>
         </p:nvSpPr>
         <p:spPr>
-          <a:xfrm flipH="false" flipV="false" rot="-5400000">
+          <a:xfrm rot="-5400000">
             <a:off x="14447908" y="5474626"/>
             <a:ext cx="1604194" cy="511628"/>
           </a:xfrm>
@@ -4299,9 +4473,9 @@
             <a:gdLst/>
             <a:ahLst/>
             <a:cxnLst/>
-            <a:rect r="r" b="b" t="t" l="l"/>
+            <a:rect l="l" t="t" r="r" b="b"/>
             <a:pathLst>
-              <a:path h="511628" w="1604194">
+              <a:path w="1604194" h="511628">
                 <a:moveTo>
                   <a:pt x="0" y="0"/>
                 </a:moveTo>
@@ -4324,19 +4498,26 @@
           <a:blipFill>
             <a:blip r:embed="rId24"/>
             <a:stretch>
-              <a:fillRect l="0" t="-148327" r="-24838" b="-143098"/>
+              <a:fillRect t="-148327" r="-24838" b="-143098"/>
             </a:stretch>
           </a:blipFill>
         </p:spPr>
-      </p:sp>
-      <p:sp>
-        <p:nvSpPr>
-          <p:cNvPr name="TextBox 28" id="28"/>
-          <p:cNvSpPr txBox="true"/>
+        <p:txBody>
+          <a:bodyPr/>
+          <a:lstStyle/>
+          <a:p>
+            <a:endParaRPr lang="pt-BR"/>
+          </a:p>
+        </p:txBody>
+      </p:sp>
+      <p:sp>
+        <p:nvSpPr>
+          <p:cNvPr id="28" name="TextBox 28"/>
+          <p:cNvSpPr txBox="1"/>
           <p:nvPr/>
         </p:nvSpPr>
         <p:spPr>
-          <a:xfrm rot="0">
+          <a:xfrm>
             <a:off x="6082754" y="-135857"/>
             <a:ext cx="6122491" cy="3195319"/>
           </a:xfrm>
@@ -4345,7 +4526,7 @@
           </a:prstGeom>
         </p:spPr>
         <p:txBody>
-          <a:bodyPr anchor="t" rtlCol="false" tIns="0" lIns="0" bIns="0" rIns="0">
+          <a:bodyPr lIns="0" tIns="0" rIns="0" bIns="0" rtlCol="0" anchor="t">
             <a:spAutoFit/>
           </a:bodyPr>
           <a:lstStyle/>
@@ -4371,17 +4552,23 @@
                 <a:spcPts val="12880"/>
               </a:lnSpc>
             </a:pPr>
-          </a:p>
-        </p:txBody>
-      </p:sp>
-      <p:sp>
-        <p:nvSpPr>
-          <p:cNvPr name="TextBox 29" id="29"/>
-          <p:cNvSpPr txBox="true"/>
+            <a:endParaRPr lang="en-US" sz="9200">
+              <a:solidFill>
+                <a:srgbClr val="000000"/>
+              </a:solidFill>
+              <a:latin typeface="Open Sans Bold"/>
+            </a:endParaRPr>
+          </a:p>
+        </p:txBody>
+      </p:sp>
+      <p:sp>
+        <p:nvSpPr>
+          <p:cNvPr id="29" name="TextBox 29"/>
+          <p:cNvSpPr txBox="1"/>
           <p:nvPr/>
         </p:nvSpPr>
         <p:spPr>
-          <a:xfrm rot="0">
+          <a:xfrm>
             <a:off x="2747268" y="1921596"/>
             <a:ext cx="5507667" cy="515600"/>
           </a:xfrm>
@@ -4390,7 +4577,7 @@
           </a:prstGeom>
         </p:spPr>
         <p:txBody>
-          <a:bodyPr anchor="t" rtlCol="false" tIns="0" lIns="0" bIns="0" rIns="0">
+          <a:bodyPr lIns="0" tIns="0" rIns="0" bIns="0" rtlCol="0" anchor="t">
             <a:spAutoFit/>
           </a:bodyPr>
           <a:lstStyle/>
@@ -4414,12 +4601,12 @@
       </p:sp>
       <p:sp>
         <p:nvSpPr>
-          <p:cNvPr name="TextBox 30" id="30"/>
-          <p:cNvSpPr txBox="true"/>
+          <p:cNvPr id="30" name="TextBox 30"/>
+          <p:cNvSpPr txBox="1"/>
           <p:nvPr/>
         </p:nvSpPr>
         <p:spPr>
-          <a:xfrm rot="0">
+          <a:xfrm>
             <a:off x="13118340" y="1722972"/>
             <a:ext cx="4263330" cy="580390"/>
           </a:xfrm>
@@ -4428,7 +4615,7 @@
           </a:prstGeom>
         </p:spPr>
         <p:txBody>
-          <a:bodyPr anchor="t" rtlCol="false" tIns="0" lIns="0" bIns="0" rIns="0">
+          <a:bodyPr lIns="0" tIns="0" rIns="0" bIns="0" rtlCol="0" anchor="t">
             <a:spAutoFit/>
           </a:bodyPr>
           <a:lstStyle/>
@@ -4452,12 +4639,12 @@
       </p:sp>
       <p:sp>
         <p:nvSpPr>
-          <p:cNvPr name="TextBox 31" id="31"/>
-          <p:cNvSpPr txBox="true"/>
+          <p:cNvPr id="31" name="TextBox 31"/>
+          <p:cNvSpPr txBox="1"/>
           <p:nvPr/>
         </p:nvSpPr>
         <p:spPr>
-          <a:xfrm rot="0">
+          <a:xfrm>
             <a:off x="2105819" y="9542141"/>
             <a:ext cx="13301334" cy="570101"/>
           </a:xfrm>
@@ -4466,7 +4653,7 @@
           </a:prstGeom>
         </p:spPr>
         <p:txBody>
-          <a:bodyPr anchor="t" rtlCol="false" tIns="0" lIns="0" bIns="0" rIns="0">
+          <a:bodyPr lIns="0" tIns="0" rIns="0" bIns="0" rtlCol="0" anchor="t">
             <a:spAutoFit/>
           </a:bodyPr>
           <a:lstStyle/>
@@ -4490,12 +4677,12 @@
       </p:sp>
       <p:sp>
         <p:nvSpPr>
-          <p:cNvPr name="Freeform 32" id="32"/>
+          <p:cNvPr id="32" name="Freeform 32"/>
           <p:cNvSpPr/>
           <p:nvPr/>
         </p:nvSpPr>
         <p:spPr>
-          <a:xfrm flipH="false" flipV="false" rot="0">
+          <a:xfrm>
             <a:off x="5800370" y="3808427"/>
             <a:ext cx="1755928" cy="560021"/>
           </a:xfrm>
@@ -4504,9 +4691,9 @@
             <a:gdLst/>
             <a:ahLst/>
             <a:cxnLst/>
-            <a:rect r="r" b="b" t="t" l="l"/>
+            <a:rect l="l" t="t" r="r" b="b"/>
             <a:pathLst>
-              <a:path h="560021" w="1755928">
+              <a:path w="1755928" h="560021">
                 <a:moveTo>
                   <a:pt x="0" y="0"/>
                 </a:moveTo>
@@ -4529,19 +4716,26 @@
           <a:blipFill>
             <a:blip r:embed="rId24"/>
             <a:stretch>
-              <a:fillRect l="0" t="-148327" r="-24838" b="-143098"/>
+              <a:fillRect t="-148327" r="-24838" b="-143098"/>
             </a:stretch>
           </a:blipFill>
         </p:spPr>
-      </p:sp>
-      <p:sp>
-        <p:nvSpPr>
-          <p:cNvPr name="Freeform 33" id="33"/>
+        <p:txBody>
+          <a:bodyPr/>
+          <a:lstStyle/>
+          <a:p>
+            <a:endParaRPr lang="pt-BR"/>
+          </a:p>
+        </p:txBody>
+      </p:sp>
+      <p:sp>
+        <p:nvSpPr>
+          <p:cNvPr id="33" name="Freeform 33"/>
           <p:cNvSpPr/>
           <p:nvPr/>
         </p:nvSpPr>
         <p:spPr>
-          <a:xfrm flipH="false" flipV="false" rot="0">
+          <a:xfrm>
             <a:off x="4979434" y="8148932"/>
             <a:ext cx="1517803" cy="484075"/>
           </a:xfrm>
@@ -4550,9 +4744,9 @@
             <a:gdLst/>
             <a:ahLst/>
             <a:cxnLst/>
-            <a:rect r="r" b="b" t="t" l="l"/>
+            <a:rect l="l" t="t" r="r" b="b"/>
             <a:pathLst>
-              <a:path h="484075" w="1517803">
+              <a:path w="1517803" h="484075">
                 <a:moveTo>
                   <a:pt x="0" y="0"/>
                 </a:moveTo>
@@ -4575,10 +4769,17 @@
           <a:blipFill>
             <a:blip r:embed="rId24"/>
             <a:stretch>
-              <a:fillRect l="0" t="-148327" r="-24838" b="-143098"/>
+              <a:fillRect t="-148327" r="-24838" b="-143098"/>
             </a:stretch>
           </a:blipFill>
         </p:spPr>
+        <p:txBody>
+          <a:bodyPr/>
+          <a:lstStyle/>
+          <a:p>
+            <a:endParaRPr lang="pt-BR"/>
+          </a:p>
+        </p:txBody>
       </p:sp>
     </p:spTree>
   </p:cSld>

</xml_diff>